<commit_message>
changes to map pin icon
</commit_message>
<xml_diff>
--- a/DesignDocs.pptx
+++ b/DesignDocs.pptx
@@ -256,7 +256,7 @@
           <a:p>
             <a:fld id="{275E4BBD-EEC3-4FAB-9FB7-6839E59ACB28}" type="datetimeFigureOut">
               <a:rPr lang="en-US" smtClean="0"/>
-              <a:t>1/11/2017</a:t>
+              <a:t>1/26/2017</a:t>
             </a:fld>
             <a:endParaRPr lang="en-US"/>
           </a:p>
@@ -426,7 +426,7 @@
           <a:p>
             <a:fld id="{275E4BBD-EEC3-4FAB-9FB7-6839E59ACB28}" type="datetimeFigureOut">
               <a:rPr lang="en-US" smtClean="0"/>
-              <a:t>1/11/2017</a:t>
+              <a:t>1/26/2017</a:t>
             </a:fld>
             <a:endParaRPr lang="en-US"/>
           </a:p>
@@ -606,7 +606,7 @@
           <a:p>
             <a:fld id="{275E4BBD-EEC3-4FAB-9FB7-6839E59ACB28}" type="datetimeFigureOut">
               <a:rPr lang="en-US" smtClean="0"/>
-              <a:t>1/11/2017</a:t>
+              <a:t>1/26/2017</a:t>
             </a:fld>
             <a:endParaRPr lang="en-US"/>
           </a:p>
@@ -776,7 +776,7 @@
           <a:p>
             <a:fld id="{275E4BBD-EEC3-4FAB-9FB7-6839E59ACB28}" type="datetimeFigureOut">
               <a:rPr lang="en-US" smtClean="0"/>
-              <a:t>1/11/2017</a:t>
+              <a:t>1/26/2017</a:t>
             </a:fld>
             <a:endParaRPr lang="en-US"/>
           </a:p>
@@ -1022,7 +1022,7 @@
           <a:p>
             <a:fld id="{275E4BBD-EEC3-4FAB-9FB7-6839E59ACB28}" type="datetimeFigureOut">
               <a:rPr lang="en-US" smtClean="0"/>
-              <a:t>1/11/2017</a:t>
+              <a:t>1/26/2017</a:t>
             </a:fld>
             <a:endParaRPr lang="en-US"/>
           </a:p>
@@ -1254,7 +1254,7 @@
           <a:p>
             <a:fld id="{275E4BBD-EEC3-4FAB-9FB7-6839E59ACB28}" type="datetimeFigureOut">
               <a:rPr lang="en-US" smtClean="0"/>
-              <a:t>1/11/2017</a:t>
+              <a:t>1/26/2017</a:t>
             </a:fld>
             <a:endParaRPr lang="en-US"/>
           </a:p>
@@ -1621,7 +1621,7 @@
           <a:p>
             <a:fld id="{275E4BBD-EEC3-4FAB-9FB7-6839E59ACB28}" type="datetimeFigureOut">
               <a:rPr lang="en-US" smtClean="0"/>
-              <a:t>1/11/2017</a:t>
+              <a:t>1/26/2017</a:t>
             </a:fld>
             <a:endParaRPr lang="en-US"/>
           </a:p>
@@ -1739,7 +1739,7 @@
           <a:p>
             <a:fld id="{275E4BBD-EEC3-4FAB-9FB7-6839E59ACB28}" type="datetimeFigureOut">
               <a:rPr lang="en-US" smtClean="0"/>
-              <a:t>1/11/2017</a:t>
+              <a:t>1/26/2017</a:t>
             </a:fld>
             <a:endParaRPr lang="en-US"/>
           </a:p>
@@ -1834,7 +1834,7 @@
           <a:p>
             <a:fld id="{275E4BBD-EEC3-4FAB-9FB7-6839E59ACB28}" type="datetimeFigureOut">
               <a:rPr lang="en-US" smtClean="0"/>
-              <a:t>1/11/2017</a:t>
+              <a:t>1/26/2017</a:t>
             </a:fld>
             <a:endParaRPr lang="en-US"/>
           </a:p>
@@ -2111,7 +2111,7 @@
           <a:p>
             <a:fld id="{275E4BBD-EEC3-4FAB-9FB7-6839E59ACB28}" type="datetimeFigureOut">
               <a:rPr lang="en-US" smtClean="0"/>
-              <a:t>1/11/2017</a:t>
+              <a:t>1/26/2017</a:t>
             </a:fld>
             <a:endParaRPr lang="en-US"/>
           </a:p>
@@ -2364,7 +2364,7 @@
           <a:p>
             <a:fld id="{275E4BBD-EEC3-4FAB-9FB7-6839E59ACB28}" type="datetimeFigureOut">
               <a:rPr lang="en-US" smtClean="0"/>
-              <a:t>1/11/2017</a:t>
+              <a:t>1/26/2017</a:t>
             </a:fld>
             <a:endParaRPr lang="en-US"/>
           </a:p>
@@ -2577,7 +2577,7 @@
           <a:p>
             <a:fld id="{275E4BBD-EEC3-4FAB-9FB7-6839E59ACB28}" type="datetimeFigureOut">
               <a:rPr lang="en-US" smtClean="0"/>
-              <a:t>1/11/2017</a:t>
+              <a:t>1/26/2017</a:t>
             </a:fld>
             <a:endParaRPr lang="en-US"/>
           </a:p>
@@ -3267,10 +3267,10 @@
         </p:nvGrpSpPr>
         <p:grpSpPr>
           <a:xfrm flipH="1" flipV="1">
-            <a:off x="4472415" y="3179805"/>
-            <a:ext cx="1314450" cy="2224217"/>
-            <a:chOff x="4472415" y="3179805"/>
-            <a:chExt cx="1314450" cy="2224217"/>
+            <a:off x="4472415" y="3140049"/>
+            <a:ext cx="1314450" cy="2250723"/>
+            <a:chOff x="4472415" y="3153299"/>
+            <a:chExt cx="1314450" cy="2250723"/>
           </a:xfrm>
         </p:grpSpPr>
         <p:sp>
@@ -3281,7 +3281,7 @@
           </p:nvSpPr>
           <p:spPr>
             <a:xfrm>
-              <a:off x="4527613" y="3179805"/>
+              <a:off x="4540865" y="3153299"/>
               <a:ext cx="1187577" cy="1237735"/>
             </a:xfrm>
             <a:prstGeom prst="triangle">

</xml_diff>